<commit_message>
Revert "Changement ppt inter"
This reverts commit fded4ab6813dafff3a35d635397a79018238fbbd.
</commit_message>
<xml_diff>
--- a/20171121.pptx
+++ b/20171121.pptx
@@ -127,15 +127,8 @@
         </p14:section>
       </p14:sectionLst>
     </p:ext>
-    <p:ext uri="{EFAFB233-063F-42B5-8137-9DF3F51BA10A}">
-      <p15:sldGuideLst xmlns:p15="http://schemas.microsoft.com/office/powerpoint/2012/main"/>
-    </p:ext>
   </p:extLst>
 </p:presentation>
-</file>
-
-<file path=ppt/revisionInfo.xml><?xml version="1.0" encoding="utf-8"?>
-<p1510:revInfo xmlns:a="http://schemas.openxmlformats.org/drawingml/2006/main" xmlns:r="http://schemas.openxmlformats.org/officeDocument/2006/relationships" xmlns:p1510="http://schemas.microsoft.com/office/powerpoint/2015/10/main"/>
 </file>
 
 <file path=ppt/slideLayouts/slideLayout1.xml><?xml version="1.0" encoding="utf-8"?>
@@ -280,7 +273,7 @@
           <a:p>
             <a:fld id="{2DAA1FD9-27B1-401A-9D3D-E42756058F37}" type="datetimeFigureOut">
               <a:rPr lang="fr-FR" smtClean="0"/>
-              <a:t>10/01/2018</a:t>
+              <a:t>20/11/2017</a:t>
             </a:fld>
             <a:endParaRPr lang="fr-FR"/>
           </a:p>
@@ -450,7 +443,7 @@
           <a:p>
             <a:fld id="{2DAA1FD9-27B1-401A-9D3D-E42756058F37}" type="datetimeFigureOut">
               <a:rPr lang="fr-FR" smtClean="0"/>
-              <a:t>10/01/2018</a:t>
+              <a:t>20/11/2017</a:t>
             </a:fld>
             <a:endParaRPr lang="fr-FR"/>
           </a:p>
@@ -630,7 +623,7 @@
           <a:p>
             <a:fld id="{2DAA1FD9-27B1-401A-9D3D-E42756058F37}" type="datetimeFigureOut">
               <a:rPr lang="fr-FR" smtClean="0"/>
-              <a:t>10/01/2018</a:t>
+              <a:t>20/11/2017</a:t>
             </a:fld>
             <a:endParaRPr lang="fr-FR"/>
           </a:p>
@@ -920,7 +913,7 @@
           <a:p>
             <a:fld id="{2DAA1FD9-27B1-401A-9D3D-E42756058F37}" type="datetimeFigureOut">
               <a:rPr lang="fr-FR" smtClean="0"/>
-              <a:t>10/01/2018</a:t>
+              <a:t>20/11/2017</a:t>
             </a:fld>
             <a:endParaRPr lang="fr-FR"/>
           </a:p>
@@ -1130,7 +1123,7 @@
           <a:p>
             <a:fld id="{2DAA1FD9-27B1-401A-9D3D-E42756058F37}" type="datetimeFigureOut">
               <a:rPr lang="fr-FR" smtClean="0"/>
-              <a:t>10/01/2018</a:t>
+              <a:t>20/11/2017</a:t>
             </a:fld>
             <a:endParaRPr lang="fr-FR"/>
           </a:p>
@@ -1406,7 +1399,7 @@
           <a:p>
             <a:fld id="{2DAA1FD9-27B1-401A-9D3D-E42756058F37}" type="datetimeFigureOut">
               <a:rPr lang="fr-FR" smtClean="0"/>
-              <a:t>10/01/2018</a:t>
+              <a:t>20/11/2017</a:t>
             </a:fld>
             <a:endParaRPr lang="fr-FR"/>
           </a:p>
@@ -1672,7 +1665,7 @@
           <a:p>
             <a:fld id="{2DAA1FD9-27B1-401A-9D3D-E42756058F37}" type="datetimeFigureOut">
               <a:rPr lang="fr-FR" smtClean="0"/>
-              <a:t>10/01/2018</a:t>
+              <a:t>20/11/2017</a:t>
             </a:fld>
             <a:endParaRPr lang="fr-FR"/>
           </a:p>
@@ -2051,7 +2044,7 @@
           <a:p>
             <a:fld id="{2DAA1FD9-27B1-401A-9D3D-E42756058F37}" type="datetimeFigureOut">
               <a:rPr lang="fr-FR" smtClean="0"/>
-              <a:t>10/01/2018</a:t>
+              <a:t>20/11/2017</a:t>
             </a:fld>
             <a:endParaRPr lang="fr-FR"/>
           </a:p>
@@ -2204,7 +2197,7 @@
           <a:p>
             <a:fld id="{2DAA1FD9-27B1-401A-9D3D-E42756058F37}" type="datetimeFigureOut">
               <a:rPr lang="fr-FR" smtClean="0"/>
-              <a:t>10/01/2018</a:t>
+              <a:t>20/11/2017</a:t>
             </a:fld>
             <a:endParaRPr lang="fr-FR"/>
           </a:p>
@@ -2329,7 +2322,7 @@
           <a:p>
             <a:fld id="{2DAA1FD9-27B1-401A-9D3D-E42756058F37}" type="datetimeFigureOut">
               <a:rPr lang="fr-FR" smtClean="0"/>
-              <a:t>10/01/2018</a:t>
+              <a:t>20/11/2017</a:t>
             </a:fld>
             <a:endParaRPr lang="fr-FR"/>
           </a:p>
@@ -2614,7 +2607,7 @@
           <a:p>
             <a:fld id="{2DAA1FD9-27B1-401A-9D3D-E42756058F37}" type="datetimeFigureOut">
               <a:rPr lang="fr-FR" smtClean="0"/>
-              <a:t>10/01/2018</a:t>
+              <a:t>20/11/2017</a:t>
             </a:fld>
             <a:endParaRPr lang="fr-FR"/>
           </a:p>
@@ -2789,7 +2782,7 @@
           <a:p>
             <a:fld id="{2DAA1FD9-27B1-401A-9D3D-E42756058F37}" type="datetimeFigureOut">
               <a:rPr lang="fr-FR" smtClean="0"/>
-              <a:t>10/01/2018</a:t>
+              <a:t>20/11/2017</a:t>
             </a:fld>
             <a:endParaRPr lang="fr-FR"/>
           </a:p>
@@ -3113,7 +3106,7 @@
           <a:p>
             <a:fld id="{2DAA1FD9-27B1-401A-9D3D-E42756058F37}" type="datetimeFigureOut">
               <a:rPr lang="fr-FR" smtClean="0"/>
-              <a:t>10/01/2018</a:t>
+              <a:t>20/11/2017</a:t>
             </a:fld>
             <a:endParaRPr lang="fr-FR"/>
           </a:p>
@@ -3437,7 +3430,7 @@
           <a:p>
             <a:fld id="{2DAA1FD9-27B1-401A-9D3D-E42756058F37}" type="datetimeFigureOut">
               <a:rPr lang="fr-FR" smtClean="0"/>
-              <a:t>10/01/2018</a:t>
+              <a:t>20/11/2017</a:t>
             </a:fld>
             <a:endParaRPr lang="fr-FR"/>
           </a:p>
@@ -3715,7 +3708,7 @@
           <a:p>
             <a:fld id="{2DAA1FD9-27B1-401A-9D3D-E42756058F37}" type="datetimeFigureOut">
               <a:rPr lang="fr-FR" smtClean="0"/>
-              <a:t>10/01/2018</a:t>
+              <a:t>20/11/2017</a:t>
             </a:fld>
             <a:endParaRPr lang="fr-FR"/>
           </a:p>
@@ -4283,7 +4276,7 @@
           <a:p>
             <a:fld id="{2DAA1FD9-27B1-401A-9D3D-E42756058F37}" type="datetimeFigureOut">
               <a:rPr lang="fr-FR" smtClean="0"/>
-              <a:t>10/01/2018</a:t>
+              <a:t>20/11/2017</a:t>
             </a:fld>
             <a:endParaRPr lang="fr-FR"/>
           </a:p>
@@ -4561,7 +4554,7 @@
           <a:p>
             <a:fld id="{2DAA1FD9-27B1-401A-9D3D-E42756058F37}" type="datetimeFigureOut">
               <a:rPr lang="fr-FR" smtClean="0"/>
-              <a:t>10/01/2018</a:t>
+              <a:t>20/11/2017</a:t>
             </a:fld>
             <a:endParaRPr lang="fr-FR"/>
           </a:p>
@@ -5123,7 +5116,7 @@
           <a:p>
             <a:fld id="{2DAA1FD9-27B1-401A-9D3D-E42756058F37}" type="datetimeFigureOut">
               <a:rPr lang="fr-FR" smtClean="0"/>
-              <a:t>10/01/2018</a:t>
+              <a:t>20/11/2017</a:t>
             </a:fld>
             <a:endParaRPr lang="fr-FR"/>
           </a:p>
@@ -5450,7 +5443,7 @@
           <a:p>
             <a:fld id="{2DAA1FD9-27B1-401A-9D3D-E42756058F37}" type="datetimeFigureOut">
               <a:rPr lang="fr-FR" smtClean="0"/>
-              <a:t>10/01/2018</a:t>
+              <a:t>20/11/2017</a:t>
             </a:fld>
             <a:endParaRPr lang="fr-FR"/>
           </a:p>
@@ -5627,7 +5620,7 @@
           <a:p>
             <a:fld id="{2DAA1FD9-27B1-401A-9D3D-E42756058F37}" type="datetimeFigureOut">
               <a:rPr lang="fr-FR" smtClean="0"/>
-              <a:t>10/01/2018</a:t>
+              <a:t>20/11/2017</a:t>
             </a:fld>
             <a:endParaRPr lang="fr-FR"/>
           </a:p>
@@ -5865,7 +5858,7 @@
           <a:p>
             <a:fld id="{2DAA1FD9-27B1-401A-9D3D-E42756058F37}" type="datetimeFigureOut">
               <a:rPr lang="fr-FR" smtClean="0"/>
-              <a:t>10/01/2018</a:t>
+              <a:t>20/11/2017</a:t>
             </a:fld>
             <a:endParaRPr lang="fr-FR"/>
           </a:p>
@@ -6116,7 +6109,7 @@
           <a:p>
             <a:fld id="{2DAA1FD9-27B1-401A-9D3D-E42756058F37}" type="datetimeFigureOut">
               <a:rPr lang="fr-FR" smtClean="0"/>
-              <a:t>10/01/2018</a:t>
+              <a:t>20/11/2017</a:t>
             </a:fld>
             <a:endParaRPr lang="fr-FR"/>
           </a:p>
@@ -6348,7 +6341,7 @@
           <a:p>
             <a:fld id="{2DAA1FD9-27B1-401A-9D3D-E42756058F37}" type="datetimeFigureOut">
               <a:rPr lang="fr-FR" smtClean="0"/>
-              <a:t>10/01/2018</a:t>
+              <a:t>20/11/2017</a:t>
             </a:fld>
             <a:endParaRPr lang="fr-FR"/>
           </a:p>
@@ -6700,7 +6693,7 @@
           <a:p>
             <a:fld id="{2DAA1FD9-27B1-401A-9D3D-E42756058F37}" type="datetimeFigureOut">
               <a:rPr lang="fr-FR" smtClean="0"/>
-              <a:t>10/01/2018</a:t>
+              <a:t>20/11/2017</a:t>
             </a:fld>
             <a:endParaRPr lang="fr-FR"/>
           </a:p>
@@ -6823,7 +6816,7 @@
           <a:p>
             <a:fld id="{2DAA1FD9-27B1-401A-9D3D-E42756058F37}" type="datetimeFigureOut">
               <a:rPr lang="fr-FR" smtClean="0"/>
-              <a:t>10/01/2018</a:t>
+              <a:t>20/11/2017</a:t>
             </a:fld>
             <a:endParaRPr lang="fr-FR"/>
           </a:p>
@@ -6941,7 +6934,7 @@
           <a:p>
             <a:fld id="{2DAA1FD9-27B1-401A-9D3D-E42756058F37}" type="datetimeFigureOut">
               <a:rPr lang="fr-FR" smtClean="0"/>
-              <a:t>10/01/2018</a:t>
+              <a:t>20/11/2017</a:t>
             </a:fld>
             <a:endParaRPr lang="fr-FR"/>
           </a:p>
@@ -7225,7 +7218,7 @@
           <a:p>
             <a:fld id="{2DAA1FD9-27B1-401A-9D3D-E42756058F37}" type="datetimeFigureOut">
               <a:rPr lang="fr-FR" smtClean="0"/>
-              <a:t>10/01/2018</a:t>
+              <a:t>20/11/2017</a:t>
             </a:fld>
             <a:endParaRPr lang="fr-FR"/>
           </a:p>
@@ -7494,7 +7487,7 @@
           <a:p>
             <a:fld id="{2DAA1FD9-27B1-401A-9D3D-E42756058F37}" type="datetimeFigureOut">
               <a:rPr lang="fr-FR" smtClean="0"/>
-              <a:t>10/01/2018</a:t>
+              <a:t>20/11/2017</a:t>
             </a:fld>
             <a:endParaRPr lang="fr-FR"/>
           </a:p>
@@ -7708,7 +7701,7 @@
           <a:p>
             <a:fld id="{2DAA1FD9-27B1-401A-9D3D-E42756058F37}" type="datetimeFigureOut">
               <a:rPr lang="fr-FR" smtClean="0"/>
-              <a:t>10/01/2018</a:t>
+              <a:t>20/11/2017</a:t>
             </a:fld>
             <a:endParaRPr lang="fr-FR"/>
           </a:p>
@@ -8243,7 +8236,7 @@
           <a:p>
             <a:fld id="{2DAA1FD9-27B1-401A-9D3D-E42756058F37}" type="datetimeFigureOut">
               <a:rPr lang="fr-FR" smtClean="0"/>
-              <a:t>10/01/2018</a:t>
+              <a:t>20/11/2017</a:t>
             </a:fld>
             <a:endParaRPr lang="fr-FR"/>
           </a:p>
@@ -9933,7 +9926,7 @@
             </a:pPr>
             <a:r>
               <a:rPr lang="fr-FR" dirty="0"/>
-              <a:t>Fonction à maximiser : minimiser les interférences</a:t>
+              <a:t>Fonction à maximiser : minimum d’antenne pour un maximum de surface ou toute la surface ?</a:t>
             </a:r>
           </a:p>
           <a:p>

</xml_diff>